<commit_message>
Poster updated for Andrew's comments. Will replace sankey diagram if it's done in time
</commit_message>
<xml_diff>
--- a/deliverables/RCV-poster.pptx
+++ b/deliverables/RCV-poster.pptx
@@ -137,6 +137,32 @@
       </a:defRPr>
     </a:lvl9pPr>
   </p:defaultTextStyle>
+  <p:extLst>
+    <p:ext uri="{EFAFB233-063F-42B5-8137-9DF3F51BA10A}">
+      <p15:sldGuideLst xmlns:p15="http://schemas.microsoft.com/office/powerpoint/2012/main">
+        <p15:guide id="1" orient="horz" pos="3224">
+          <p15:clr>
+            <a:srgbClr val="A4A3A4"/>
+          </p15:clr>
+        </p15:guide>
+        <p15:guide id="2" orient="horz" pos="13464">
+          <p15:clr>
+            <a:srgbClr val="A4A3A4"/>
+          </p15:clr>
+        </p15:guide>
+        <p15:guide id="3" orient="horz" pos="1432">
+          <p15:clr>
+            <a:srgbClr val="A4A3A4"/>
+          </p15:clr>
+        </p15:guide>
+        <p15:guide id="4" pos="10368">
+          <p15:clr>
+            <a:srgbClr val="A4A3A4"/>
+          </p15:clr>
+        </p15:guide>
+      </p15:sldGuideLst>
+    </p:ext>
+  </p:extLst>
 </p:presentation>
 </file>
 
@@ -190,14 +216,14 @@
           <a:effectLst/>
           <a:extLst>
             <a:ext uri="{909E8E84-426E-40dd-AFC4-6F175D3DCCD1}">
-              <a14:hiddenFill xmlns:a14="http://schemas.microsoft.com/office/drawing/2010/main">
+              <a14:hiddenFill xmlns:a14="http://schemas.microsoft.com/office/drawing/2010/main" xmlns="">
                 <a:solidFill>
                   <a:schemeClr val="accent1"/>
                 </a:solidFill>
               </a14:hiddenFill>
             </a:ext>
             <a:ext uri="{91240B29-F687-4f45-9708-019B960494DF}">
-              <a14:hiddenLine xmlns:a14="http://schemas.microsoft.com/office/drawing/2010/main" w="9525">
+              <a14:hiddenLine xmlns:a14="http://schemas.microsoft.com/office/drawing/2010/main" xmlns="" w="9525">
                 <a:solidFill>
                   <a:schemeClr val="tx1"/>
                 </a:solidFill>
@@ -207,7 +233,7 @@
               </a14:hiddenLine>
             </a:ext>
             <a:ext uri="{AF507438-7753-43e0-B8FC-AC1667EBCBE1}">
-              <a14:hiddenEffects xmlns:a14="http://schemas.microsoft.com/office/drawing/2010/main">
+              <a14:hiddenEffects xmlns:a14="http://schemas.microsoft.com/office/drawing/2010/main" xmlns="">
                 <a:effectLst>
                   <a:outerShdw dist="35921" dir="2700000" algn="ctr" rotWithShape="0">
                     <a:schemeClr val="bg2"/>
@@ -258,14 +284,14 @@
           <a:effectLst/>
           <a:extLst>
             <a:ext uri="{909E8E84-426E-40dd-AFC4-6F175D3DCCD1}">
-              <a14:hiddenFill xmlns:a14="http://schemas.microsoft.com/office/drawing/2010/main">
+              <a14:hiddenFill xmlns:a14="http://schemas.microsoft.com/office/drawing/2010/main" xmlns="">
                 <a:solidFill>
                   <a:schemeClr val="accent1"/>
                 </a:solidFill>
               </a14:hiddenFill>
             </a:ext>
             <a:ext uri="{91240B29-F687-4f45-9708-019B960494DF}">
-              <a14:hiddenLine xmlns:a14="http://schemas.microsoft.com/office/drawing/2010/main" w="9525">
+              <a14:hiddenLine xmlns:a14="http://schemas.microsoft.com/office/drawing/2010/main" xmlns="" w="9525">
                 <a:solidFill>
                   <a:schemeClr val="tx1"/>
                 </a:solidFill>
@@ -275,7 +301,7 @@
               </a14:hiddenLine>
             </a:ext>
             <a:ext uri="{AF507438-7753-43e0-B8FC-AC1667EBCBE1}">
-              <a14:hiddenEffects xmlns:a14="http://schemas.microsoft.com/office/drawing/2010/main">
+              <a14:hiddenEffects xmlns:a14="http://schemas.microsoft.com/office/drawing/2010/main" xmlns="">
                 <a:effectLst>
                   <a:outerShdw dist="35921" dir="2700000" algn="ctr" rotWithShape="0">
                     <a:schemeClr val="bg2"/>
@@ -331,7 +357,7 @@
           <a:effectLst/>
           <a:extLst>
             <a:ext uri="{AF507438-7753-43e0-B8FC-AC1667EBCBE1}">
-              <a14:hiddenEffects xmlns:a14="http://schemas.microsoft.com/office/drawing/2010/main">
+              <a14:hiddenEffects xmlns:a14="http://schemas.microsoft.com/office/drawing/2010/main" xmlns="">
                 <a:effectLst>
                   <a:outerShdw dist="35921" dir="2700000" algn="ctr" rotWithShape="0">
                     <a:srgbClr val="808080"/>
@@ -340,7 +366,7 @@
               </a14:hiddenEffects>
             </a:ext>
             <a:ext uri="{53640926-AAD7-44d8-BBD7-CCE9431645EC}">
-              <a14:shadowObscured xmlns:a14="http://schemas.microsoft.com/office/drawing/2010/main" val="1"/>
+              <a14:shadowObscured xmlns:a14="http://schemas.microsoft.com/office/drawing/2010/main" xmlns="" val="1"/>
             </a:ext>
           </a:extLst>
         </p:spPr>
@@ -370,14 +396,14 @@
           <a:effectLst/>
           <a:extLst>
             <a:ext uri="{909E8E84-426E-40dd-AFC4-6F175D3DCCD1}">
-              <a14:hiddenFill xmlns:a14="http://schemas.microsoft.com/office/drawing/2010/main">
+              <a14:hiddenFill xmlns:a14="http://schemas.microsoft.com/office/drawing/2010/main" xmlns="">
                 <a:solidFill>
                   <a:schemeClr val="accent1"/>
                 </a:solidFill>
               </a14:hiddenFill>
             </a:ext>
             <a:ext uri="{91240B29-F687-4f45-9708-019B960494DF}">
-              <a14:hiddenLine xmlns:a14="http://schemas.microsoft.com/office/drawing/2010/main" w="9525">
+              <a14:hiddenLine xmlns:a14="http://schemas.microsoft.com/office/drawing/2010/main" xmlns="" w="9525">
                 <a:solidFill>
                   <a:schemeClr val="tx1"/>
                 </a:solidFill>
@@ -387,7 +413,7 @@
               </a14:hiddenLine>
             </a:ext>
             <a:ext uri="{AF507438-7753-43e0-B8FC-AC1667EBCBE1}">
-              <a14:hiddenEffects xmlns:a14="http://schemas.microsoft.com/office/drawing/2010/main">
+              <a14:hiddenEffects xmlns:a14="http://schemas.microsoft.com/office/drawing/2010/main" xmlns="">
                 <a:effectLst>
                   <a:outerShdw dist="35921" dir="2700000" algn="ctr" rotWithShape="0">
                     <a:schemeClr val="bg2"/>
@@ -466,14 +492,14 @@
           <a:effectLst/>
           <a:extLst>
             <a:ext uri="{909E8E84-426E-40dd-AFC4-6F175D3DCCD1}">
-              <a14:hiddenFill xmlns:a14="http://schemas.microsoft.com/office/drawing/2010/main">
+              <a14:hiddenFill xmlns:a14="http://schemas.microsoft.com/office/drawing/2010/main" xmlns="">
                 <a:solidFill>
                   <a:schemeClr val="accent1"/>
                 </a:solidFill>
               </a14:hiddenFill>
             </a:ext>
             <a:ext uri="{91240B29-F687-4f45-9708-019B960494DF}">
-              <a14:hiddenLine xmlns:a14="http://schemas.microsoft.com/office/drawing/2010/main" w="9525">
+              <a14:hiddenLine xmlns:a14="http://schemas.microsoft.com/office/drawing/2010/main" xmlns="" w="9525">
                 <a:solidFill>
                   <a:schemeClr val="tx1"/>
                 </a:solidFill>
@@ -483,7 +509,7 @@
               </a14:hiddenLine>
             </a:ext>
             <a:ext uri="{AF507438-7753-43e0-B8FC-AC1667EBCBE1}">
-              <a14:hiddenEffects xmlns:a14="http://schemas.microsoft.com/office/drawing/2010/main">
+              <a14:hiddenEffects xmlns:a14="http://schemas.microsoft.com/office/drawing/2010/main" xmlns="">
                 <a:effectLst>
                   <a:outerShdw dist="35921" dir="2700000" algn="ctr" rotWithShape="0">
                     <a:schemeClr val="bg2"/>
@@ -534,14 +560,14 @@
           <a:effectLst/>
           <a:extLst>
             <a:ext uri="{909E8E84-426E-40dd-AFC4-6F175D3DCCD1}">
-              <a14:hiddenFill xmlns:a14="http://schemas.microsoft.com/office/drawing/2010/main">
+              <a14:hiddenFill xmlns:a14="http://schemas.microsoft.com/office/drawing/2010/main" xmlns="">
                 <a:solidFill>
                   <a:schemeClr val="accent1"/>
                 </a:solidFill>
               </a14:hiddenFill>
             </a:ext>
             <a:ext uri="{91240B29-F687-4f45-9708-019B960494DF}">
-              <a14:hiddenLine xmlns:a14="http://schemas.microsoft.com/office/drawing/2010/main" w="9525">
+              <a14:hiddenLine xmlns:a14="http://schemas.microsoft.com/office/drawing/2010/main" xmlns="" w="9525">
                 <a:solidFill>
                   <a:schemeClr val="tx1"/>
                 </a:solidFill>
@@ -551,7 +577,7 @@
               </a14:hiddenLine>
             </a:ext>
             <a:ext uri="{AF507438-7753-43e0-B8FC-AC1667EBCBE1}">
-              <a14:hiddenEffects xmlns:a14="http://schemas.microsoft.com/office/drawing/2010/main">
+              <a14:hiddenEffects xmlns:a14="http://schemas.microsoft.com/office/drawing/2010/main" xmlns="">
                 <a:effectLst>
                   <a:outerShdw dist="35921" dir="2700000" algn="ctr" rotWithShape="0">
                     <a:schemeClr val="bg2"/>
@@ -2585,7 +2611,7 @@
           <a:graphicData uri="http://schemas.openxmlformats.org/presentationml/2006/ole">
             <mc:AlternateContent xmlns:mc="http://schemas.openxmlformats.org/markup-compatibility/2006">
               <mc:Choice xmlns:v="urn:schemas-microsoft-com:vml" Requires="v">
-                <p:oleObj spid="_x0000_s1069" name="CorelDRAW" r:id="rId14" imgW="8828280" imgH="313200" progId="CorelDRAW.Graphic.13">
+                <p:oleObj spid="_x0000_s1072" name="CorelDRAW" r:id="rId14" imgW="8828280" imgH="313200" progId="CorelDRAW.Graphic.13">
                   <p:embed/>
                 </p:oleObj>
               </mc:Choice>
@@ -2628,14 +2654,14 @@
                       <a:effectLst/>
                       <a:extLst>
                         <a:ext uri="{909E8E84-426E-40dd-AFC4-6F175D3DCCD1}">
-                          <a14:hiddenFill xmlns:a14="http://schemas.microsoft.com/office/drawing/2010/main">
+                          <a14:hiddenFill xmlns:a14="http://schemas.microsoft.com/office/drawing/2010/main" xmlns="">
                             <a:solidFill>
                               <a:schemeClr val="bg1"/>
                             </a:solidFill>
                           </a14:hiddenFill>
                         </a:ext>
                         <a:ext uri="{91240B29-F687-4f45-9708-019B960494DF}">
-                          <a14:hiddenLine xmlns:a14="http://schemas.microsoft.com/office/drawing/2010/main" w="9525" algn="ctr">
+                          <a14:hiddenLine xmlns:a14="http://schemas.microsoft.com/office/drawing/2010/main" xmlns="" w="9525" algn="ctr">
                             <a:solidFill>
                               <a:schemeClr val="tx1"/>
                             </a:solidFill>
@@ -2645,7 +2671,7 @@
                           </a14:hiddenLine>
                         </a:ext>
                         <a:ext uri="{AF507438-7753-43e0-B8FC-AC1667EBCBE1}">
-                          <a14:hiddenEffects xmlns:a14="http://schemas.microsoft.com/office/drawing/2010/main">
+                          <a14:hiddenEffects xmlns:a14="http://schemas.microsoft.com/office/drawing/2010/main" xmlns="">
                             <a:effectLst>
                               <a:outerShdw dist="35921" dir="2700000" algn="ctr" rotWithShape="0">
                                 <a:schemeClr val="bg2"/>
@@ -3082,7 +3108,7 @@
         </p:nvSpPr>
         <p:spPr bwMode="auto">
           <a:xfrm>
-            <a:off x="24631650" y="362831"/>
+            <a:off x="315461" y="362832"/>
             <a:ext cx="7772400" cy="21023969"/>
           </a:xfrm>
           <a:prstGeom prst="roundRect">
@@ -3104,7 +3130,7 @@
           <a:effectLst/>
           <a:extLst>
             <a:ext uri="{AF507438-7753-43e0-B8FC-AC1667EBCBE1}">
-              <a14:hiddenEffects xmlns:a14="http://schemas.microsoft.com/office/drawing/2010/main">
+              <a14:hiddenEffects xmlns:a14="http://schemas.microsoft.com/office/drawing/2010/main" xmlns="">
                 <a:effectLst>
                   <a:outerShdw dist="35921" dir="2700000" algn="ctr" rotWithShape="0">
                     <a:schemeClr val="bg2"/>
@@ -3132,7 +3158,7 @@
         </p:nvSpPr>
         <p:spPr bwMode="auto">
           <a:xfrm>
-            <a:off x="634981" y="3809724"/>
+            <a:off x="8640011" y="3855079"/>
             <a:ext cx="23771066" cy="17484970"/>
           </a:xfrm>
           <a:prstGeom prst="roundRect">
@@ -3154,7 +3180,7 @@
           <a:effectLst/>
           <a:extLst>
             <a:ext uri="{AF507438-7753-43e0-B8FC-AC1667EBCBE1}">
-              <a14:hiddenEffects xmlns:a14="http://schemas.microsoft.com/office/drawing/2010/main">
+              <a14:hiddenEffects xmlns:a14="http://schemas.microsoft.com/office/drawing/2010/main" xmlns="">
                 <a:effectLst>
                   <a:outerShdw dist="35921" dir="2700000" algn="ctr" rotWithShape="0">
                     <a:schemeClr val="bg2"/>
@@ -3168,10 +3194,6 @@
           <a:bodyPr wrap="none" anchor="ctr"/>
           <a:lstStyle/>
           <a:p>
-            <a:r>
-              <a:rPr lang="en-US" sz="1200" dirty="0" err="1" smtClean="0"/>
-              <a:t>jknef</a:t>
-            </a:r>
             <a:endParaRPr lang="en-US" sz="1200" dirty="0"/>
           </a:p>
         </p:txBody>
@@ -3186,7 +3208,7 @@
         </p:nvSpPr>
         <p:spPr bwMode="auto">
           <a:xfrm>
-            <a:off x="24806016" y="11771886"/>
+            <a:off x="9078942" y="4417143"/>
             <a:ext cx="7372350" cy="847696"/>
           </a:xfrm>
           <a:prstGeom prst="rect">
@@ -3199,14 +3221,14 @@
           <a:effectLst/>
           <a:extLst>
             <a:ext uri="{909E8E84-426E-40dd-AFC4-6F175D3DCCD1}">
-              <a14:hiddenFill xmlns:a14="http://schemas.microsoft.com/office/drawing/2010/main">
+              <a14:hiddenFill xmlns:a14="http://schemas.microsoft.com/office/drawing/2010/main" xmlns="">
                 <a:solidFill>
                   <a:schemeClr val="accent1"/>
                 </a:solidFill>
               </a14:hiddenFill>
             </a:ext>
             <a:ext uri="{91240B29-F687-4f45-9708-019B960494DF}">
-              <a14:hiddenLine xmlns:a14="http://schemas.microsoft.com/office/drawing/2010/main" w="9525">
+              <a14:hiddenLine xmlns:a14="http://schemas.microsoft.com/office/drawing/2010/main" xmlns="" w="9525">
                 <a:solidFill>
                   <a:schemeClr val="tx1"/>
                 </a:solidFill>
@@ -3216,7 +3238,7 @@
               </a14:hiddenLine>
             </a:ext>
             <a:ext uri="{AF507438-7753-43e0-B8FC-AC1667EBCBE1}">
-              <a14:hiddenEffects xmlns:a14="http://schemas.microsoft.com/office/drawing/2010/main">
+              <a14:hiddenEffects xmlns:a14="http://schemas.microsoft.com/office/drawing/2010/main" xmlns="">
                 <a:effectLst>
                   <a:outerShdw dist="35921" dir="2700000" algn="ctr" rotWithShape="0">
                     <a:schemeClr val="bg2"/>
@@ -3339,11 +3361,7 @@
             </a:pPr>
             <a:r>
               <a:rPr lang="en-US" altLang="en-US" sz="4400" b="1" dirty="0" smtClean="0"/>
-              <a:t>Why use RCV</a:t>
-            </a:r>
-            <a:r>
-              <a:rPr lang="en-US" altLang="en-US" sz="4400" b="1" dirty="0" smtClean="0"/>
-              <a:t>?</a:t>
+              <a:t>Why use RCV?</a:t>
             </a:r>
           </a:p>
           <a:p>
@@ -3377,7 +3395,7 @@
         </p:nvSpPr>
         <p:spPr bwMode="auto">
           <a:xfrm>
-            <a:off x="514350" y="453539"/>
+            <a:off x="8519380" y="498894"/>
             <a:ext cx="23888129" cy="3038708"/>
           </a:xfrm>
           <a:prstGeom prst="roundRect">
@@ -3519,7 +3537,7 @@
         </p:nvSpPr>
         <p:spPr bwMode="auto">
           <a:xfrm>
-            <a:off x="606615" y="317477"/>
+            <a:off x="8611645" y="362832"/>
             <a:ext cx="23705149" cy="2897488"/>
           </a:xfrm>
           <a:prstGeom prst="rect">
@@ -3532,14 +3550,14 @@
           <a:effectLst/>
           <a:extLst>
             <a:ext uri="{909E8E84-426E-40dd-AFC4-6F175D3DCCD1}">
-              <a14:hiddenFill xmlns:a14="http://schemas.microsoft.com/office/drawing/2010/main">
+              <a14:hiddenFill xmlns:a14="http://schemas.microsoft.com/office/drawing/2010/main" xmlns="">
                 <a:solidFill>
                   <a:schemeClr val="accent1"/>
                 </a:solidFill>
               </a14:hiddenFill>
             </a:ext>
             <a:ext uri="{91240B29-F687-4f45-9708-019B960494DF}">
-              <a14:hiddenLine xmlns:a14="http://schemas.microsoft.com/office/drawing/2010/main" w="9525">
+              <a14:hiddenLine xmlns:a14="http://schemas.microsoft.com/office/drawing/2010/main" xmlns="" w="9525">
                 <a:solidFill>
                   <a:schemeClr val="tx1"/>
                 </a:solidFill>
@@ -3549,7 +3567,7 @@
               </a14:hiddenLine>
             </a:ext>
             <a:ext uri="{AF507438-7753-43e0-B8FC-AC1667EBCBE1}">
-              <a14:hiddenEffects xmlns:a14="http://schemas.microsoft.com/office/drawing/2010/main">
+              <a14:hiddenEffects xmlns:a14="http://schemas.microsoft.com/office/drawing/2010/main" xmlns="">
                 <a:effectLst>
                   <a:outerShdw dist="35921" dir="2700000" algn="ctr" rotWithShape="0">
                     <a:schemeClr val="bg2"/>
@@ -3699,11 +3717,7 @@
             </a:r>
             <a:r>
               <a:rPr lang="en-US" altLang="en-US" sz="3400" b="1" i="1" dirty="0" smtClean="0"/>
-              <a:t>, Reed College </a:t>
-            </a:r>
-            <a:r>
-              <a:rPr lang="en-US" altLang="en-US" sz="3400" b="1" i="1" dirty="0" smtClean="0"/>
-              <a:t>&amp; Theo Landsman ‘16, </a:t>
+              <a:t>, Reed College &amp; Theo Landsman ‘16, </a:t>
             </a:r>
             <a:r>
               <a:rPr lang="en-US" altLang="en-US" sz="3400" b="1" i="1" dirty="0" err="1" smtClean="0"/>
@@ -3723,7 +3737,7 @@
         </p:nvSpPr>
         <p:spPr bwMode="auto">
           <a:xfrm>
-            <a:off x="24639923" y="12867017"/>
+            <a:off x="8912849" y="5512274"/>
             <a:ext cx="7738503" cy="3828738"/>
           </a:xfrm>
           <a:prstGeom prst="rect">
@@ -3736,14 +3750,14 @@
           <a:effectLst/>
           <a:extLst>
             <a:ext uri="{909E8E84-426E-40dd-AFC4-6F175D3DCCD1}">
-              <a14:hiddenFill xmlns:a14="http://schemas.microsoft.com/office/drawing/2010/main">
+              <a14:hiddenFill xmlns:a14="http://schemas.microsoft.com/office/drawing/2010/main" xmlns="">
                 <a:solidFill>
                   <a:schemeClr val="bg1"/>
                 </a:solidFill>
               </a14:hiddenFill>
             </a:ext>
             <a:ext uri="{91240B29-F687-4f45-9708-019B960494DF}">
-              <a14:hiddenLine xmlns:a14="http://schemas.microsoft.com/office/drawing/2010/main" w="57150" cmpd="thinThick">
+              <a14:hiddenLine xmlns:a14="http://schemas.microsoft.com/office/drawing/2010/main" xmlns="" w="57150" cmpd="thinThick">
                 <a:solidFill>
                   <a:schemeClr val="tx1"/>
                 </a:solidFill>
@@ -3753,7 +3767,7 @@
               </a14:hiddenLine>
             </a:ext>
             <a:ext uri="{AF507438-7753-43e0-B8FC-AC1667EBCBE1}">
-              <a14:hiddenEffects xmlns:a14="http://schemas.microsoft.com/office/drawing/2010/main">
+              <a14:hiddenEffects xmlns:a14="http://schemas.microsoft.com/office/drawing/2010/main" xmlns="">
                 <a:effectLst>
                   <a:outerShdw dist="35921" dir="2700000" algn="ctr" rotWithShape="0">
                     <a:schemeClr val="bg2"/>
@@ -3959,7 +3973,7 @@
         </p:nvSpPr>
         <p:spPr bwMode="auto">
           <a:xfrm>
-            <a:off x="26594409" y="21533320"/>
+            <a:off x="26595898" y="21613880"/>
             <a:ext cx="5904603" cy="331720"/>
           </a:xfrm>
           <a:prstGeom prst="rect">
@@ -4023,8 +4037,8 @@
         </p:nvSpPr>
         <p:spPr>
           <a:xfrm>
-            <a:off x="8678055" y="20532655"/>
-            <a:ext cx="15817416" cy="769441"/>
+            <a:off x="8975019" y="20578010"/>
+            <a:ext cx="23525482" cy="769441"/>
           </a:xfrm>
           <a:prstGeom prst="rect">
             <a:avLst/>
@@ -4048,6 +4062,26 @@
             <a:r>
               <a:rPr lang="en-US" sz="4400" b="1" dirty="0" smtClean="0"/>
               <a:t>/reed-</a:t>
+            </a:r>
+            <a:r>
+              <a:rPr lang="en-US" sz="4400" b="1" dirty="0" err="1" smtClean="0"/>
+              <a:t>rcv</a:t>
+            </a:r>
+            <a:r>
+              <a:rPr lang="en-US" sz="4400" b="1" dirty="0" smtClean="0"/>
+              <a:t> </a:t>
+            </a:r>
+            <a:r>
+              <a:rPr lang="en-US" sz="4400" b="1" dirty="0"/>
+              <a:t>and </a:t>
+            </a:r>
+            <a:r>
+              <a:rPr lang="en-US" sz="4400" b="1" dirty="0" err="1" smtClean="0"/>
+              <a:t>github.com</a:t>
+            </a:r>
+            <a:r>
+              <a:rPr lang="en-US" sz="4400" b="1" dirty="0" smtClean="0"/>
+              <a:t>/ds-elections/</a:t>
             </a:r>
             <a:r>
               <a:rPr lang="en-US" sz="4400" b="1" dirty="0" err="1" smtClean="0"/>
@@ -4079,7 +4113,7 @@
         </p:blipFill>
         <p:spPr>
           <a:xfrm>
-            <a:off x="9108611" y="4321629"/>
+            <a:off x="17113641" y="4366984"/>
             <a:ext cx="4775556" cy="4335292"/>
           </a:xfrm>
           <a:prstGeom prst="rect">
@@ -4095,7 +4129,7 @@
         </p:nvSpPr>
         <p:spPr bwMode="auto">
           <a:xfrm>
-            <a:off x="14185703" y="6427103"/>
+            <a:off x="22190733" y="6472458"/>
             <a:ext cx="1399167" cy="636762"/>
           </a:xfrm>
           <a:prstGeom prst="rightArrow">
@@ -4116,7 +4150,7 @@
           <a:effectLst/>
           <a:extLst>
             <a:ext uri="{AF507438-7753-43e0-B8FC-AC1667EBCBE1}">
-              <a14:hiddenEffects xmlns:a14="http://schemas.microsoft.com/office/drawing/2010/main">
+              <a14:hiddenEffects xmlns:a14="http://schemas.microsoft.com/office/drawing/2010/main" xmlns="">
                 <a:effectLst>
                   <a:outerShdw dist="35921" dir="2700000" algn="ctr" rotWithShape="0">
                     <a:schemeClr val="bg2"/>
@@ -4185,7 +4219,7 @@
         </p:blipFill>
         <p:spPr>
           <a:xfrm>
-            <a:off x="15912748" y="4558873"/>
+            <a:off x="23917778" y="4604228"/>
             <a:ext cx="8179817" cy="4285131"/>
           </a:xfrm>
           <a:prstGeom prst="rect">
@@ -4195,7 +4229,7 @@
       </p:pic>
       <p:pic>
         <p:nvPicPr>
-          <p:cNvPr id="9" name="Picture 8" descr="Screen Shot 2017-05-09 at 6.47.20 PM.png"/>
+          <p:cNvPr id="12" name="Picture 11" descr="Screen Shot 2017-05-09 at 9.40.05 PM.png"/>
           <p:cNvPicPr>
             <a:picLocks noChangeAspect="1"/>
           </p:cNvPicPr>
@@ -4215,17 +4249,539 @@
         </p:blipFill>
         <p:spPr>
           <a:xfrm>
-            <a:off x="969989" y="4433340"/>
-            <a:ext cx="7756747" cy="5555849"/>
+            <a:off x="17756649" y="12145624"/>
+            <a:ext cx="13595683" cy="8659155"/>
           </a:xfrm>
           <a:prstGeom prst="rect">
             <a:avLst/>
           </a:prstGeom>
         </p:spPr>
       </p:pic>
+      <p:cxnSp>
+        <p:nvCxnSpPr>
+          <p:cNvPr id="16" name="Straight Connector 15"/>
+          <p:cNvCxnSpPr/>
+          <p:nvPr/>
+        </p:nvCxnSpPr>
+        <p:spPr bwMode="auto">
+          <a:xfrm flipV="1">
+            <a:off x="16995498" y="11159568"/>
+            <a:ext cx="15257751" cy="22789"/>
+          </a:xfrm>
+          <a:prstGeom prst="line">
+            <a:avLst/>
+          </a:prstGeom>
+          <a:solidFill>
+            <a:schemeClr val="bg1"/>
+          </a:solidFill>
+          <a:ln w="9525" cap="flat" cmpd="sng" algn="ctr">
+            <a:solidFill>
+              <a:schemeClr val="tx1"/>
+            </a:solidFill>
+            <a:prstDash val="solid"/>
+            <a:round/>
+            <a:headEnd type="none" w="med" len="med"/>
+            <a:tailEnd type="none" w="med" len="med"/>
+          </a:ln>
+          <a:effectLst/>
+          <a:extLst>
+            <a:ext uri="{AF507438-7753-43e0-B8FC-AC1667EBCBE1}">
+              <a14:hiddenEffects xmlns:a14="http://schemas.microsoft.com/office/drawing/2010/main" xmlns="">
+                <a:effectLst>
+                  <a:outerShdw dist="35921" dir="2700000" algn="ctr" rotWithShape="0">
+                    <a:schemeClr val="bg2"/>
+                  </a:outerShdw>
+                </a:effectLst>
+              </a14:hiddenEffects>
+            </a:ext>
+          </a:extLst>
+        </p:spPr>
+      </p:cxnSp>
+      <p:sp>
+        <p:nvSpPr>
+          <p:cNvPr id="18" name="TextBox 17"/>
+          <p:cNvSpPr txBox="1"/>
+          <p:nvPr/>
+        </p:nvSpPr>
+        <p:spPr>
+          <a:xfrm>
+            <a:off x="17370603" y="9926828"/>
+            <a:ext cx="184666" cy="415498"/>
+          </a:xfrm>
+          <a:prstGeom prst="rect">
+            <a:avLst/>
+          </a:prstGeom>
+          <a:noFill/>
+        </p:spPr>
+        <p:txBody>
+          <a:bodyPr wrap="none" rtlCol="0">
+            <a:spAutoFit/>
+          </a:bodyPr>
+          <a:lstStyle/>
+          <a:p>
+            <a:endParaRPr lang="en-US" sz="2100" dirty="0"/>
+          </a:p>
+        </p:txBody>
+      </p:sp>
+      <p:sp>
+        <p:nvSpPr>
+          <p:cNvPr id="19" name="TextBox 18"/>
+          <p:cNvSpPr txBox="1"/>
+          <p:nvPr/>
+        </p:nvSpPr>
+        <p:spPr>
+          <a:xfrm>
+            <a:off x="17053125" y="9040524"/>
+            <a:ext cx="4801841" cy="1554272"/>
+          </a:xfrm>
+          <a:prstGeom prst="rect">
+            <a:avLst/>
+          </a:prstGeom>
+          <a:noFill/>
+        </p:spPr>
+        <p:txBody>
+          <a:bodyPr wrap="square" rtlCol="0">
+            <a:spAutoFit/>
+          </a:bodyPr>
+          <a:lstStyle/>
+          <a:p>
+            <a:r>
+              <a:rPr lang="en-US" sz="1900" b="1" dirty="0" smtClean="0"/>
+              <a:t>Raw ballot image from San Francisco's 2016 Election Board of Supervisors:</a:t>
+            </a:r>
+          </a:p>
+          <a:p>
+            <a:r>
+              <a:rPr lang="en-US" sz="1900" dirty="0" smtClean="0"/>
+              <a:t>Each voter has three lines:</a:t>
+            </a:r>
+          </a:p>
+          <a:p>
+            <a:r>
+              <a:rPr lang="en-US" sz="1900" dirty="0" smtClean="0"/>
+              <a:t>each line consists a unique voter code, precinct, district, and a candidate selection.</a:t>
+            </a:r>
+            <a:endParaRPr lang="en-US" sz="1900" dirty="0"/>
+          </a:p>
+        </p:txBody>
+      </p:sp>
+      <p:sp>
+        <p:nvSpPr>
+          <p:cNvPr id="31" name="TextBox 30"/>
+          <p:cNvSpPr txBox="1"/>
+          <p:nvPr/>
+        </p:nvSpPr>
+        <p:spPr>
+          <a:xfrm>
+            <a:off x="25407564" y="9034169"/>
+            <a:ext cx="4801841" cy="1261884"/>
+          </a:xfrm>
+          <a:prstGeom prst="rect">
+            <a:avLst/>
+          </a:prstGeom>
+          <a:noFill/>
+        </p:spPr>
+        <p:txBody>
+          <a:bodyPr wrap="square" rtlCol="0">
+            <a:spAutoFit/>
+          </a:bodyPr>
+          <a:lstStyle/>
+          <a:p>
+            <a:r>
+              <a:rPr lang="en-US" sz="1900" b="1" dirty="0" smtClean="0"/>
+              <a:t>Output from raw ballot image:</a:t>
+            </a:r>
+          </a:p>
+          <a:p>
+            <a:r>
+              <a:rPr lang="en-US" sz="1900" dirty="0" smtClean="0"/>
+              <a:t>The table displays one voter on each line with their parsed information including their ranked candidates.</a:t>
+            </a:r>
+            <a:endParaRPr lang="en-US" sz="1900" dirty="0"/>
+          </a:p>
+        </p:txBody>
+      </p:sp>
+      <p:sp>
+        <p:nvSpPr>
+          <p:cNvPr id="32" name="Text Box 11"/>
+          <p:cNvSpPr txBox="1">
+            <a:spLocks noChangeArrowheads="1"/>
+          </p:cNvSpPr>
+          <p:nvPr/>
+        </p:nvSpPr>
+        <p:spPr bwMode="auto">
+          <a:xfrm>
+            <a:off x="8925375" y="17166311"/>
+            <a:ext cx="7372350" cy="573775"/>
+          </a:xfrm>
+          <a:prstGeom prst="rect">
+            <a:avLst/>
+          </a:prstGeom>
+          <a:noFill/>
+          <a:ln>
+            <a:noFill/>
+          </a:ln>
+          <a:effectLst/>
+          <a:extLst>
+            <a:ext uri="{909E8E84-426E-40dd-AFC4-6F175D3DCCD1}">
+              <a14:hiddenFill xmlns:a14="http://schemas.microsoft.com/office/drawing/2010/main" xmlns="">
+                <a:solidFill>
+                  <a:schemeClr val="accent1"/>
+                </a:solidFill>
+              </a14:hiddenFill>
+            </a:ext>
+            <a:ext uri="{91240B29-F687-4f45-9708-019B960494DF}">
+              <a14:hiddenLine xmlns:a14="http://schemas.microsoft.com/office/drawing/2010/main" xmlns="" w="9525">
+                <a:solidFill>
+                  <a:schemeClr val="tx1"/>
+                </a:solidFill>
+                <a:miter lim="800000"/>
+                <a:headEnd/>
+                <a:tailEnd/>
+              </a14:hiddenLine>
+            </a:ext>
+            <a:ext uri="{AF507438-7753-43e0-B8FC-AC1667EBCBE1}">
+              <a14:hiddenEffects xmlns:a14="http://schemas.microsoft.com/office/drawing/2010/main" xmlns="">
+                <a:effectLst>
+                  <a:outerShdw dist="35921" dir="2700000" algn="ctr" rotWithShape="0">
+                    <a:schemeClr val="bg2"/>
+                  </a:outerShdw>
+                </a:effectLst>
+              </a14:hiddenEffects>
+            </a:ext>
+          </a:extLst>
+        </p:spPr>
+        <p:txBody>
+          <a:bodyPr lIns="65306" tIns="32653" rIns="65306" bIns="32653">
+            <a:spAutoFit/>
+          </a:bodyPr>
+          <a:lstStyle>
+            <a:lvl1pPr algn="l" defTabSz="3135313">
+              <a:defRPr>
+                <a:solidFill>
+                  <a:schemeClr val="tx1"/>
+                </a:solidFill>
+                <a:latin typeface="Arial" charset="0"/>
+              </a:defRPr>
+            </a:lvl1pPr>
+            <a:lvl2pPr marL="327025" algn="l" defTabSz="3135313">
+              <a:defRPr>
+                <a:solidFill>
+                  <a:schemeClr val="tx1"/>
+                </a:solidFill>
+                <a:latin typeface="Arial" charset="0"/>
+              </a:defRPr>
+            </a:lvl2pPr>
+            <a:lvl3pPr marL="652463" algn="l" defTabSz="3135313">
+              <a:defRPr>
+                <a:solidFill>
+                  <a:schemeClr val="tx1"/>
+                </a:solidFill>
+                <a:latin typeface="Arial" charset="0"/>
+              </a:defRPr>
+            </a:lvl3pPr>
+            <a:lvl4pPr marL="979488" algn="l" defTabSz="3135313">
+              <a:defRPr>
+                <a:solidFill>
+                  <a:schemeClr val="tx1"/>
+                </a:solidFill>
+                <a:latin typeface="Arial" charset="0"/>
+              </a:defRPr>
+            </a:lvl4pPr>
+            <a:lvl5pPr marL="1306513" algn="l" defTabSz="3135313">
+              <a:defRPr>
+                <a:solidFill>
+                  <a:schemeClr val="tx1"/>
+                </a:solidFill>
+                <a:latin typeface="Arial" charset="0"/>
+              </a:defRPr>
+            </a:lvl5pPr>
+            <a:lvl6pPr marL="1763713" defTabSz="3135313" fontAlgn="base">
+              <a:spcBef>
+                <a:spcPct val="0"/>
+              </a:spcBef>
+              <a:spcAft>
+                <a:spcPct val="0"/>
+              </a:spcAft>
+              <a:defRPr>
+                <a:solidFill>
+                  <a:schemeClr val="tx1"/>
+                </a:solidFill>
+                <a:latin typeface="Arial" charset="0"/>
+              </a:defRPr>
+            </a:lvl6pPr>
+            <a:lvl7pPr marL="2220913" defTabSz="3135313" fontAlgn="base">
+              <a:spcBef>
+                <a:spcPct val="0"/>
+              </a:spcBef>
+              <a:spcAft>
+                <a:spcPct val="0"/>
+              </a:spcAft>
+              <a:defRPr>
+                <a:solidFill>
+                  <a:schemeClr val="tx1"/>
+                </a:solidFill>
+                <a:latin typeface="Arial" charset="0"/>
+              </a:defRPr>
+            </a:lvl7pPr>
+            <a:lvl8pPr marL="2678113" defTabSz="3135313" fontAlgn="base">
+              <a:spcBef>
+                <a:spcPct val="0"/>
+              </a:spcBef>
+              <a:spcAft>
+                <a:spcPct val="0"/>
+              </a:spcAft>
+              <a:defRPr>
+                <a:solidFill>
+                  <a:schemeClr val="tx1"/>
+                </a:solidFill>
+                <a:latin typeface="Arial" charset="0"/>
+              </a:defRPr>
+            </a:lvl8pPr>
+            <a:lvl9pPr marL="3135313" defTabSz="3135313" fontAlgn="base">
+              <a:spcBef>
+                <a:spcPct val="0"/>
+              </a:spcBef>
+              <a:spcAft>
+                <a:spcPct val="0"/>
+              </a:spcAft>
+              <a:defRPr>
+                <a:solidFill>
+                  <a:schemeClr val="tx1"/>
+                </a:solidFill>
+                <a:latin typeface="Arial" charset="0"/>
+              </a:defRPr>
+            </a:lvl9pPr>
+          </a:lstStyle>
+          <a:p>
+            <a:pPr algn="ctr">
+              <a:lnSpc>
+                <a:spcPct val="70000"/>
+              </a:lnSpc>
+              <a:spcBef>
+                <a:spcPct val="50000"/>
+              </a:spcBef>
+            </a:pPr>
+            <a:r>
+              <a:rPr lang="en-US" altLang="en-US" sz="4400" b="1" dirty="0" smtClean="0"/>
+              <a:t>Acknowledgments</a:t>
+            </a:r>
+          </a:p>
+        </p:txBody>
+      </p:sp>
+      <p:sp>
+        <p:nvSpPr>
+          <p:cNvPr id="33" name="Text Box 40"/>
+          <p:cNvSpPr txBox="1">
+            <a:spLocks noChangeArrowheads="1"/>
+          </p:cNvSpPr>
+          <p:nvPr/>
+        </p:nvSpPr>
+        <p:spPr bwMode="auto">
+          <a:xfrm>
+            <a:off x="9109296" y="17891126"/>
+            <a:ext cx="7302600" cy="2098008"/>
+          </a:xfrm>
+          <a:prstGeom prst="rect">
+            <a:avLst/>
+          </a:prstGeom>
+          <a:noFill/>
+          <a:ln>
+            <a:noFill/>
+          </a:ln>
+          <a:effectLst/>
+          <a:extLst>
+            <a:ext uri="{909E8E84-426E-40dd-AFC4-6F175D3DCCD1}">
+              <a14:hiddenFill xmlns:a14="http://schemas.microsoft.com/office/drawing/2010/main" xmlns="">
+                <a:solidFill>
+                  <a:schemeClr val="bg1"/>
+                </a:solidFill>
+              </a14:hiddenFill>
+            </a:ext>
+            <a:ext uri="{91240B29-F687-4f45-9708-019B960494DF}">
+              <a14:hiddenLine xmlns:a14="http://schemas.microsoft.com/office/drawing/2010/main" xmlns="" w="57150" cmpd="thinThick">
+                <a:solidFill>
+                  <a:schemeClr val="tx1"/>
+                </a:solidFill>
+                <a:miter lim="800000"/>
+                <a:headEnd/>
+                <a:tailEnd/>
+              </a14:hiddenLine>
+            </a:ext>
+            <a:ext uri="{AF507438-7753-43e0-B8FC-AC1667EBCBE1}">
+              <a14:hiddenEffects xmlns:a14="http://schemas.microsoft.com/office/drawing/2010/main" xmlns="">
+                <a:effectLst>
+                  <a:outerShdw dist="35921" dir="2700000" algn="ctr" rotWithShape="0">
+                    <a:schemeClr val="bg2"/>
+                  </a:outerShdw>
+                </a:effectLst>
+              </a14:hiddenEffects>
+            </a:ext>
+          </a:extLst>
+        </p:spPr>
+        <p:txBody>
+          <a:bodyPr wrap="square" lIns="43688" tIns="21843" rIns="43688" bIns="21843">
+            <a:spAutoFit/>
+          </a:bodyPr>
+          <a:lstStyle>
+            <a:lvl1pPr algn="l" defTabSz="438150">
+              <a:defRPr>
+                <a:solidFill>
+                  <a:schemeClr val="tx1"/>
+                </a:solidFill>
+                <a:latin typeface="Arial" charset="0"/>
+              </a:defRPr>
+            </a:lvl1pPr>
+            <a:lvl2pPr marL="219075" algn="l" defTabSz="438150">
+              <a:defRPr>
+                <a:solidFill>
+                  <a:schemeClr val="tx1"/>
+                </a:solidFill>
+                <a:latin typeface="Arial" charset="0"/>
+              </a:defRPr>
+            </a:lvl2pPr>
+            <a:lvl3pPr marL="438150" algn="l" defTabSz="438150">
+              <a:defRPr>
+                <a:solidFill>
+                  <a:schemeClr val="tx1"/>
+                </a:solidFill>
+                <a:latin typeface="Arial" charset="0"/>
+              </a:defRPr>
+            </a:lvl3pPr>
+            <a:lvl4pPr marL="654050" algn="l" defTabSz="438150">
+              <a:defRPr>
+                <a:solidFill>
+                  <a:schemeClr val="tx1"/>
+                </a:solidFill>
+                <a:latin typeface="Arial" charset="0"/>
+              </a:defRPr>
+            </a:lvl4pPr>
+            <a:lvl5pPr marL="873125" algn="l" defTabSz="438150">
+              <a:defRPr>
+                <a:solidFill>
+                  <a:schemeClr val="tx1"/>
+                </a:solidFill>
+                <a:latin typeface="Arial" charset="0"/>
+              </a:defRPr>
+            </a:lvl5pPr>
+            <a:lvl6pPr marL="1330325" defTabSz="438150" fontAlgn="base">
+              <a:spcBef>
+                <a:spcPct val="0"/>
+              </a:spcBef>
+              <a:spcAft>
+                <a:spcPct val="0"/>
+              </a:spcAft>
+              <a:defRPr>
+                <a:solidFill>
+                  <a:schemeClr val="tx1"/>
+                </a:solidFill>
+                <a:latin typeface="Arial" charset="0"/>
+              </a:defRPr>
+            </a:lvl6pPr>
+            <a:lvl7pPr marL="1787525" defTabSz="438150" fontAlgn="base">
+              <a:spcBef>
+                <a:spcPct val="0"/>
+              </a:spcBef>
+              <a:spcAft>
+                <a:spcPct val="0"/>
+              </a:spcAft>
+              <a:defRPr>
+                <a:solidFill>
+                  <a:schemeClr val="tx1"/>
+                </a:solidFill>
+                <a:latin typeface="Arial" charset="0"/>
+              </a:defRPr>
+            </a:lvl7pPr>
+            <a:lvl8pPr marL="2244725" defTabSz="438150" fontAlgn="base">
+              <a:spcBef>
+                <a:spcPct val="0"/>
+              </a:spcBef>
+              <a:spcAft>
+                <a:spcPct val="0"/>
+              </a:spcAft>
+              <a:defRPr>
+                <a:solidFill>
+                  <a:schemeClr val="tx1"/>
+                </a:solidFill>
+                <a:latin typeface="Arial" charset="0"/>
+              </a:defRPr>
+            </a:lvl8pPr>
+            <a:lvl9pPr marL="2701925" defTabSz="438150" fontAlgn="base">
+              <a:spcBef>
+                <a:spcPct val="0"/>
+              </a:spcBef>
+              <a:spcAft>
+                <a:spcPct val="0"/>
+              </a:spcAft>
+              <a:defRPr>
+                <a:solidFill>
+                  <a:schemeClr val="tx1"/>
+                </a:solidFill>
+                <a:latin typeface="Arial" charset="0"/>
+              </a:defRPr>
+            </a:lvl9pPr>
+          </a:lstStyle>
+          <a:p>
+            <a:pPr algn="ctr" eaLnBrk="0" hangingPunct="0">
+              <a:lnSpc>
+                <a:spcPct val="120000"/>
+              </a:lnSpc>
+            </a:pPr>
+            <a:r>
+              <a:rPr lang="en-US" altLang="en-US" sz="2800" dirty="0" smtClean="0">
+                <a:latin typeface="Arial"/>
+                <a:cs typeface="Arial"/>
+              </a:rPr>
+              <a:t>Theo Landsman </a:t>
+            </a:r>
+            <a:r>
+              <a:rPr lang="mr-IN" altLang="en-US" sz="2800" dirty="0" smtClean="0">
+                <a:latin typeface="Arial"/>
+                <a:cs typeface="Arial"/>
+              </a:rPr>
+              <a:t>’</a:t>
+            </a:r>
+            <a:r>
+              <a:rPr lang="en-US" altLang="en-US" sz="2800" dirty="0" smtClean="0">
+                <a:latin typeface="Arial"/>
+                <a:cs typeface="Arial"/>
+              </a:rPr>
+              <a:t>16, Alameda County Registrar of Voters, San Francisco County Department of Elections, Prof. Andrew Bray, Prof. Paul </a:t>
+            </a:r>
+            <a:r>
+              <a:rPr lang="en-US" altLang="en-US" sz="2800" dirty="0" err="1" smtClean="0">
+                <a:latin typeface="Arial"/>
+                <a:cs typeface="Arial"/>
+              </a:rPr>
+              <a:t>Gronke</a:t>
+            </a:r>
+            <a:r>
+              <a:rPr lang="en-US" altLang="en-US" sz="2800" dirty="0" smtClean="0">
+                <a:latin typeface="Arial"/>
+                <a:cs typeface="Arial"/>
+              </a:rPr>
+              <a:t>, and Chester </a:t>
+            </a:r>
+            <a:r>
+              <a:rPr lang="en-US" altLang="en-US" sz="2800" dirty="0" err="1" smtClean="0">
+                <a:latin typeface="Arial"/>
+                <a:cs typeface="Arial"/>
+              </a:rPr>
+              <a:t>Ismay</a:t>
+            </a:r>
+            <a:r>
+              <a:rPr lang="en-US" altLang="en-US" sz="2800" dirty="0" smtClean="0">
+                <a:latin typeface="Arial"/>
+                <a:cs typeface="Arial"/>
+              </a:rPr>
+              <a:t> </a:t>
+            </a:r>
+          </a:p>
+        </p:txBody>
+      </p:sp>
       <p:pic>
         <p:nvPicPr>
-          <p:cNvPr id="10" name="Picture 9" descr="Screen Shot 2017-05-09 at 6.47.57 PM.png"/>
+          <p:cNvPr id="21" name="Picture 20" descr="rcv_process.jpg"/>
           <p:cNvPicPr>
             <a:picLocks noChangeAspect="1"/>
           </p:cNvPicPr>
@@ -4245,17 +4801,183 @@
         </p:blipFill>
         <p:spPr>
           <a:xfrm>
-            <a:off x="1287894" y="11583209"/>
-            <a:ext cx="7708250" cy="8939600"/>
+            <a:off x="539515" y="8926873"/>
+            <a:ext cx="7437730" cy="11717651"/>
           </a:xfrm>
           <a:prstGeom prst="rect">
             <a:avLst/>
           </a:prstGeom>
         </p:spPr>
       </p:pic>
+      <p:cxnSp>
+        <p:nvCxnSpPr>
+          <p:cNvPr id="36" name="Straight Connector 35"/>
+          <p:cNvCxnSpPr/>
+          <p:nvPr/>
+        </p:nvCxnSpPr>
+        <p:spPr bwMode="auto">
+          <a:xfrm flipV="1">
+            <a:off x="537434" y="8531642"/>
+            <a:ext cx="7239026" cy="82087"/>
+          </a:xfrm>
+          <a:prstGeom prst="line">
+            <a:avLst/>
+          </a:prstGeom>
+          <a:solidFill>
+            <a:schemeClr val="bg1"/>
+          </a:solidFill>
+          <a:ln w="9525" cap="flat" cmpd="sng" algn="ctr">
+            <a:solidFill>
+              <a:schemeClr val="tx1"/>
+            </a:solidFill>
+            <a:prstDash val="solid"/>
+            <a:round/>
+            <a:headEnd type="none" w="med" len="med"/>
+            <a:tailEnd type="none" w="med" len="med"/>
+          </a:ln>
+          <a:effectLst/>
+          <a:extLst>
+            <a:ext uri="{AF507438-7753-43e0-B8FC-AC1667EBCBE1}">
+              <a14:hiddenEffects xmlns:a14="http://schemas.microsoft.com/office/drawing/2010/main" xmlns="">
+                <a:effectLst>
+                  <a:outerShdw dist="35921" dir="2700000" algn="ctr" rotWithShape="0">
+                    <a:schemeClr val="bg2"/>
+                  </a:outerShdw>
+                </a:effectLst>
+              </a14:hiddenEffects>
+            </a:ext>
+          </a:extLst>
+        </p:spPr>
+      </p:cxnSp>
+      <p:sp>
+        <p:nvSpPr>
+          <p:cNvPr id="3" name="TextBox 2"/>
+          <p:cNvSpPr txBox="1"/>
+          <p:nvPr/>
+        </p:nvSpPr>
+        <p:spPr>
+          <a:xfrm>
+            <a:off x="779113" y="703160"/>
+            <a:ext cx="6755667" cy="7802136"/>
+          </a:xfrm>
+          <a:prstGeom prst="rect">
+            <a:avLst/>
+          </a:prstGeom>
+          <a:noFill/>
+        </p:spPr>
+        <p:txBody>
+          <a:bodyPr wrap="square" rtlCol="0">
+            <a:spAutoFit/>
+          </a:bodyPr>
+          <a:lstStyle/>
+          <a:p>
+            <a:r>
+              <a:rPr lang="en-US" b="1" dirty="0" smtClean="0"/>
+              <a:t>Objectives</a:t>
+            </a:r>
+          </a:p>
+          <a:p>
+            <a:pPr marL="571500" indent="-571500" algn="l">
+              <a:buFontTx/>
+              <a:buChar char="-"/>
+            </a:pPr>
+            <a:r>
+              <a:rPr lang="en-US" sz="4000" dirty="0" smtClean="0"/>
+              <a:t>How does RCV work?</a:t>
+            </a:r>
+          </a:p>
+          <a:p>
+            <a:pPr marL="571500" indent="-571500" algn="l">
+              <a:buFontTx/>
+              <a:buChar char="-"/>
+            </a:pPr>
+            <a:r>
+              <a:rPr lang="en-US" sz="4000" dirty="0" smtClean="0"/>
+              <a:t>Why is this important?</a:t>
+            </a:r>
+          </a:p>
+          <a:p>
+            <a:pPr marL="571500" indent="-571500" algn="l">
+              <a:buFontTx/>
+              <a:buChar char="-"/>
+            </a:pPr>
+            <a:r>
+              <a:rPr lang="en-US" sz="4000" dirty="0" smtClean="0"/>
+              <a:t>What’s the best way to explain this to voters?</a:t>
+            </a:r>
+          </a:p>
+          <a:p>
+            <a:pPr marL="571500" indent="-571500" algn="l">
+              <a:buFontTx/>
+              <a:buChar char="-"/>
+            </a:pPr>
+            <a:r>
+              <a:rPr lang="en-US" sz="4000" dirty="0" smtClean="0"/>
+              <a:t>How can we diagram this process to aid in voter education?</a:t>
+            </a:r>
+          </a:p>
+          <a:p>
+            <a:pPr marL="571500" indent="-571500" algn="l">
+              <a:buFontTx/>
+              <a:buChar char="-"/>
+            </a:pPr>
+            <a:r>
+              <a:rPr lang="en-US" sz="4000" dirty="0" smtClean="0"/>
+              <a:t>Can we automate these ideas using open-source software?</a:t>
+            </a:r>
+          </a:p>
+          <a:p>
+            <a:pPr marL="571500" indent="-571500" algn="l">
+              <a:buFontTx/>
+              <a:buChar char="-"/>
+            </a:pPr>
+            <a:endParaRPr lang="en-US" sz="4000" dirty="0"/>
+          </a:p>
+        </p:txBody>
+      </p:sp>
+      <p:cxnSp>
+        <p:nvCxnSpPr>
+          <p:cNvPr id="29" name="Straight Connector 28"/>
+          <p:cNvCxnSpPr/>
+          <p:nvPr/>
+        </p:nvCxnSpPr>
+        <p:spPr bwMode="auto">
+          <a:xfrm>
+            <a:off x="16896777" y="4032228"/>
+            <a:ext cx="325" cy="16612296"/>
+          </a:xfrm>
+          <a:prstGeom prst="line">
+            <a:avLst/>
+          </a:prstGeom>
+          <a:solidFill>
+            <a:schemeClr val="bg1"/>
+          </a:solidFill>
+          <a:ln w="9525" cap="flat" cmpd="sng" algn="ctr">
+            <a:solidFill>
+              <a:schemeClr val="tx1"/>
+            </a:solidFill>
+            <a:prstDash val="solid"/>
+            <a:round/>
+            <a:headEnd type="none" w="med" len="med"/>
+            <a:tailEnd type="none" w="med" len="med"/>
+          </a:ln>
+          <a:effectLst/>
+          <a:extLst>
+            <a:ext uri="{AF507438-7753-43e0-B8FC-AC1667EBCBE1}">
+              <a14:hiddenEffects xmlns:a14="http://schemas.microsoft.com/office/drawing/2010/main" xmlns="">
+                <a:effectLst>
+                  <a:outerShdw dist="35921" dir="2700000" algn="ctr" rotWithShape="0">
+                    <a:schemeClr val="bg2"/>
+                  </a:outerShdw>
+                </a:effectLst>
+              </a14:hiddenEffects>
+            </a:ext>
+          </a:extLst>
+        </p:spPr>
+      </p:cxnSp>
       <p:pic>
         <p:nvPicPr>
-          <p:cNvPr id="11" name="Picture 10" descr="Screen Shot 2017-05-09 at 6.54.01 PM.png"/>
+          <p:cNvPr id="22" name="Picture 21"/>
           <p:cNvPicPr>
             <a:picLocks noChangeAspect="1"/>
           </p:cNvPicPr>
@@ -4275,120 +4997,24 @@
         </p:blipFill>
         <p:spPr>
           <a:xfrm>
-            <a:off x="12387254" y="11915631"/>
-            <a:ext cx="8382000" cy="2070100"/>
+            <a:off x="8793538" y="11990489"/>
+            <a:ext cx="7886700" cy="3530600"/>
           </a:xfrm>
           <a:prstGeom prst="rect">
             <a:avLst/>
           </a:prstGeom>
         </p:spPr>
       </p:pic>
-      <p:pic>
-        <p:nvPicPr>
-          <p:cNvPr id="12" name="Picture 11" descr="Screen Shot 2017-05-09 at 9.40.05 PM.png"/>
-          <p:cNvPicPr>
-            <a:picLocks noChangeAspect="1"/>
-          </p:cNvPicPr>
-          <p:nvPr/>
-        </p:nvPicPr>
-        <p:blipFill>
-          <a:blip r:embed="rId8">
-            <a:extLst>
-              <a:ext uri="{28A0092B-C50C-407E-A947-70E740481C1C}">
-                <a14:useLocalDpi xmlns:a14="http://schemas.microsoft.com/office/drawing/2010/main" val="0"/>
-              </a:ext>
-            </a:extLst>
-          </a:blip>
-          <a:stretch>
-            <a:fillRect/>
-          </a:stretch>
-        </p:blipFill>
-        <p:spPr>
-          <a:xfrm>
-            <a:off x="11874522" y="14247379"/>
-            <a:ext cx="9843819" cy="6269575"/>
-          </a:xfrm>
-          <a:prstGeom prst="rect">
-            <a:avLst/>
-          </a:prstGeom>
-        </p:spPr>
-      </p:pic>
-      <p:cxnSp>
-        <p:nvCxnSpPr>
-          <p:cNvPr id="16" name="Straight Connector 15"/>
-          <p:cNvCxnSpPr/>
-          <p:nvPr/>
-        </p:nvCxnSpPr>
-        <p:spPr bwMode="auto">
-          <a:xfrm flipV="1">
-            <a:off x="674639" y="11111697"/>
-            <a:ext cx="23691723" cy="79368"/>
-          </a:xfrm>
-          <a:prstGeom prst="line">
-            <a:avLst/>
-          </a:prstGeom>
-          <a:solidFill>
-            <a:schemeClr val="bg1"/>
-          </a:solidFill>
-          <a:ln w="9525" cap="flat" cmpd="sng" algn="ctr">
-            <a:solidFill>
-              <a:schemeClr val="tx1"/>
-            </a:solidFill>
-            <a:prstDash val="solid"/>
-            <a:round/>
-            <a:headEnd type="none" w="med" len="med"/>
-            <a:tailEnd type="none" w="med" len="med"/>
-          </a:ln>
-          <a:effectLst/>
-          <a:extLst>
-            <a:ext uri="{AF507438-7753-43e0-B8FC-AC1667EBCBE1}">
-              <a14:hiddenEffects xmlns:a14="http://schemas.microsoft.com/office/drawing/2010/main">
-                <a:effectLst>
-                  <a:outerShdw dist="35921" dir="2700000" algn="ctr" rotWithShape="0">
-                    <a:schemeClr val="bg2"/>
-                  </a:outerShdw>
-                </a:effectLst>
-              </a14:hiddenEffects>
-            </a:ext>
-          </a:extLst>
-        </p:spPr>
-      </p:cxnSp>
       <p:sp>
         <p:nvSpPr>
-          <p:cNvPr id="18" name="TextBox 17"/>
+          <p:cNvPr id="23" name="TextBox 22"/>
           <p:cNvSpPr txBox="1"/>
           <p:nvPr/>
         </p:nvSpPr>
         <p:spPr>
           <a:xfrm>
-            <a:off x="9365573" y="9881473"/>
-            <a:ext cx="184666" cy="415498"/>
-          </a:xfrm>
-          <a:prstGeom prst="rect">
-            <a:avLst/>
-          </a:prstGeom>
-          <a:noFill/>
-        </p:spPr>
-        <p:txBody>
-          <a:bodyPr wrap="none" rtlCol="0">
-            <a:spAutoFit/>
-          </a:bodyPr>
-          <a:lstStyle/>
-          <a:p>
-            <a:endParaRPr lang="en-US" sz="2100" dirty="0"/>
-          </a:p>
-        </p:txBody>
-      </p:sp>
-      <p:sp>
-        <p:nvSpPr>
-          <p:cNvPr id="19" name="TextBox 18"/>
-          <p:cNvSpPr txBox="1"/>
-          <p:nvPr/>
-        </p:nvSpPr>
-        <p:spPr>
-          <a:xfrm>
-            <a:off x="9048095" y="8995169"/>
-            <a:ext cx="4801841" cy="1554272"/>
+            <a:off x="8737851" y="10785084"/>
+            <a:ext cx="7942387" cy="830997"/>
           </a:xfrm>
           <a:prstGeom prst="rect">
             <a:avLst/>
@@ -4402,35 +5028,23 @@
           <a:lstStyle/>
           <a:p>
             <a:r>
-              <a:rPr lang="en-US" sz="1900" b="1" dirty="0" smtClean="0"/>
-              <a:t>Raw ballot image from San Francisco's 2016 Election Board of Supervisors:</a:t>
-            </a:r>
-          </a:p>
-          <a:p>
-            <a:r>
-              <a:rPr lang="en-US" sz="1900" dirty="0" smtClean="0"/>
-              <a:t>Each voter has three lines:</a:t>
-            </a:r>
-          </a:p>
-          <a:p>
-            <a:r>
-              <a:rPr lang="en-US" sz="1900" dirty="0" smtClean="0"/>
-              <a:t>each line consists a unique voter code, precinct, district, and a candidate selection.</a:t>
-            </a:r>
-            <a:endParaRPr lang="en-US" sz="1900" dirty="0"/>
+              <a:rPr lang="en-US" sz="4800" b="1" dirty="0" smtClean="0"/>
+              <a:t>Example RCV Results</a:t>
+            </a:r>
+            <a:endParaRPr lang="en-US" sz="4800" b="1" dirty="0"/>
           </a:p>
         </p:txBody>
       </p:sp>
       <p:sp>
         <p:nvSpPr>
-          <p:cNvPr id="31" name="TextBox 30"/>
+          <p:cNvPr id="37" name="TextBox 36"/>
           <p:cNvSpPr txBox="1"/>
           <p:nvPr/>
         </p:nvSpPr>
         <p:spPr>
           <a:xfrm>
-            <a:off x="17402534" y="8988814"/>
-            <a:ext cx="4801841" cy="1261884"/>
+            <a:off x="19711994" y="11406611"/>
+            <a:ext cx="9884190" cy="830997"/>
           </a:xfrm>
           <a:prstGeom prst="rect">
             <a:avLst/>
@@ -4444,467 +5058,17 @@
           <a:lstStyle/>
           <a:p>
             <a:r>
-              <a:rPr lang="en-US" sz="1900" b="1" dirty="0" smtClean="0"/>
-              <a:t>Output from raw ballot image:</a:t>
-            </a:r>
-          </a:p>
-          <a:p>
-            <a:r>
-              <a:rPr lang="en-US" sz="1900" dirty="0" smtClean="0"/>
-              <a:t>The table displays one voter on each line with their parsed information including their ranked candidates.</a:t>
-            </a:r>
-            <a:endParaRPr lang="en-US" sz="1900" dirty="0"/>
+              <a:rPr lang="en-US" sz="4800" b="1" smtClean="0"/>
+              <a:t>Sankey Diagram of </a:t>
+            </a:r>
+            <a:r>
+              <a:rPr lang="en-US" sz="4800" b="1" dirty="0" smtClean="0"/>
+              <a:t>RCV Results</a:t>
+            </a:r>
+            <a:endParaRPr lang="en-US" sz="4800" b="1" dirty="0"/>
           </a:p>
         </p:txBody>
       </p:sp>
-      <p:sp>
-        <p:nvSpPr>
-          <p:cNvPr id="32" name="Text Box 11"/>
-          <p:cNvSpPr txBox="1">
-            <a:spLocks noChangeArrowheads="1"/>
-          </p:cNvSpPr>
-          <p:nvPr/>
-        </p:nvSpPr>
-        <p:spPr bwMode="auto">
-          <a:xfrm>
-            <a:off x="24717495" y="17381339"/>
-            <a:ext cx="7372350" cy="573775"/>
-          </a:xfrm>
-          <a:prstGeom prst="rect">
-            <a:avLst/>
-          </a:prstGeom>
-          <a:noFill/>
-          <a:ln>
-            <a:noFill/>
-          </a:ln>
-          <a:effectLst/>
-          <a:extLst>
-            <a:ext uri="{909E8E84-426E-40dd-AFC4-6F175D3DCCD1}">
-              <a14:hiddenFill xmlns:a14="http://schemas.microsoft.com/office/drawing/2010/main">
-                <a:solidFill>
-                  <a:schemeClr val="accent1"/>
-                </a:solidFill>
-              </a14:hiddenFill>
-            </a:ext>
-            <a:ext uri="{91240B29-F687-4f45-9708-019B960494DF}">
-              <a14:hiddenLine xmlns:a14="http://schemas.microsoft.com/office/drawing/2010/main" w="9525">
-                <a:solidFill>
-                  <a:schemeClr val="tx1"/>
-                </a:solidFill>
-                <a:miter lim="800000"/>
-                <a:headEnd/>
-                <a:tailEnd/>
-              </a14:hiddenLine>
-            </a:ext>
-            <a:ext uri="{AF507438-7753-43e0-B8FC-AC1667EBCBE1}">
-              <a14:hiddenEffects xmlns:a14="http://schemas.microsoft.com/office/drawing/2010/main">
-                <a:effectLst>
-                  <a:outerShdw dist="35921" dir="2700000" algn="ctr" rotWithShape="0">
-                    <a:schemeClr val="bg2"/>
-                  </a:outerShdw>
-                </a:effectLst>
-              </a14:hiddenEffects>
-            </a:ext>
-          </a:extLst>
-        </p:spPr>
-        <p:txBody>
-          <a:bodyPr lIns="65306" tIns="32653" rIns="65306" bIns="32653">
-            <a:spAutoFit/>
-          </a:bodyPr>
-          <a:lstStyle>
-            <a:lvl1pPr algn="l" defTabSz="3135313">
-              <a:defRPr>
-                <a:solidFill>
-                  <a:schemeClr val="tx1"/>
-                </a:solidFill>
-                <a:latin typeface="Arial" charset="0"/>
-              </a:defRPr>
-            </a:lvl1pPr>
-            <a:lvl2pPr marL="327025" algn="l" defTabSz="3135313">
-              <a:defRPr>
-                <a:solidFill>
-                  <a:schemeClr val="tx1"/>
-                </a:solidFill>
-                <a:latin typeface="Arial" charset="0"/>
-              </a:defRPr>
-            </a:lvl2pPr>
-            <a:lvl3pPr marL="652463" algn="l" defTabSz="3135313">
-              <a:defRPr>
-                <a:solidFill>
-                  <a:schemeClr val="tx1"/>
-                </a:solidFill>
-                <a:latin typeface="Arial" charset="0"/>
-              </a:defRPr>
-            </a:lvl3pPr>
-            <a:lvl4pPr marL="979488" algn="l" defTabSz="3135313">
-              <a:defRPr>
-                <a:solidFill>
-                  <a:schemeClr val="tx1"/>
-                </a:solidFill>
-                <a:latin typeface="Arial" charset="0"/>
-              </a:defRPr>
-            </a:lvl4pPr>
-            <a:lvl5pPr marL="1306513" algn="l" defTabSz="3135313">
-              <a:defRPr>
-                <a:solidFill>
-                  <a:schemeClr val="tx1"/>
-                </a:solidFill>
-                <a:latin typeface="Arial" charset="0"/>
-              </a:defRPr>
-            </a:lvl5pPr>
-            <a:lvl6pPr marL="1763713" defTabSz="3135313" fontAlgn="base">
-              <a:spcBef>
-                <a:spcPct val="0"/>
-              </a:spcBef>
-              <a:spcAft>
-                <a:spcPct val="0"/>
-              </a:spcAft>
-              <a:defRPr>
-                <a:solidFill>
-                  <a:schemeClr val="tx1"/>
-                </a:solidFill>
-                <a:latin typeface="Arial" charset="0"/>
-              </a:defRPr>
-            </a:lvl6pPr>
-            <a:lvl7pPr marL="2220913" defTabSz="3135313" fontAlgn="base">
-              <a:spcBef>
-                <a:spcPct val="0"/>
-              </a:spcBef>
-              <a:spcAft>
-                <a:spcPct val="0"/>
-              </a:spcAft>
-              <a:defRPr>
-                <a:solidFill>
-                  <a:schemeClr val="tx1"/>
-                </a:solidFill>
-                <a:latin typeface="Arial" charset="0"/>
-              </a:defRPr>
-            </a:lvl7pPr>
-            <a:lvl8pPr marL="2678113" defTabSz="3135313" fontAlgn="base">
-              <a:spcBef>
-                <a:spcPct val="0"/>
-              </a:spcBef>
-              <a:spcAft>
-                <a:spcPct val="0"/>
-              </a:spcAft>
-              <a:defRPr>
-                <a:solidFill>
-                  <a:schemeClr val="tx1"/>
-                </a:solidFill>
-                <a:latin typeface="Arial" charset="0"/>
-              </a:defRPr>
-            </a:lvl8pPr>
-            <a:lvl9pPr marL="3135313" defTabSz="3135313" fontAlgn="base">
-              <a:spcBef>
-                <a:spcPct val="0"/>
-              </a:spcBef>
-              <a:spcAft>
-                <a:spcPct val="0"/>
-              </a:spcAft>
-              <a:defRPr>
-                <a:solidFill>
-                  <a:schemeClr val="tx1"/>
-                </a:solidFill>
-                <a:latin typeface="Arial" charset="0"/>
-              </a:defRPr>
-            </a:lvl9pPr>
-          </a:lstStyle>
-          <a:p>
-            <a:pPr algn="ctr">
-              <a:lnSpc>
-                <a:spcPct val="70000"/>
-              </a:lnSpc>
-              <a:spcBef>
-                <a:spcPct val="50000"/>
-              </a:spcBef>
-            </a:pPr>
-            <a:r>
-              <a:rPr lang="en-US" altLang="en-US" sz="4400" b="1" dirty="0" smtClean="0"/>
-              <a:t>Acknowledgments</a:t>
-            </a:r>
-          </a:p>
-        </p:txBody>
-      </p:sp>
-      <p:sp>
-        <p:nvSpPr>
-          <p:cNvPr id="33" name="Text Box 40"/>
-          <p:cNvSpPr txBox="1">
-            <a:spLocks noChangeArrowheads="1"/>
-          </p:cNvSpPr>
-          <p:nvPr/>
-        </p:nvSpPr>
-        <p:spPr bwMode="auto">
-          <a:xfrm>
-            <a:off x="24901416" y="18106154"/>
-            <a:ext cx="7302600" cy="2098008"/>
-          </a:xfrm>
-          <a:prstGeom prst="rect">
-            <a:avLst/>
-          </a:prstGeom>
-          <a:noFill/>
-          <a:ln>
-            <a:noFill/>
-          </a:ln>
-          <a:effectLst/>
-          <a:extLst>
-            <a:ext uri="{909E8E84-426E-40dd-AFC4-6F175D3DCCD1}">
-              <a14:hiddenFill xmlns:a14="http://schemas.microsoft.com/office/drawing/2010/main">
-                <a:solidFill>
-                  <a:schemeClr val="bg1"/>
-                </a:solidFill>
-              </a14:hiddenFill>
-            </a:ext>
-            <a:ext uri="{91240B29-F687-4f45-9708-019B960494DF}">
-              <a14:hiddenLine xmlns:a14="http://schemas.microsoft.com/office/drawing/2010/main" w="57150" cmpd="thinThick">
-                <a:solidFill>
-                  <a:schemeClr val="tx1"/>
-                </a:solidFill>
-                <a:miter lim="800000"/>
-                <a:headEnd/>
-                <a:tailEnd/>
-              </a14:hiddenLine>
-            </a:ext>
-            <a:ext uri="{AF507438-7753-43e0-B8FC-AC1667EBCBE1}">
-              <a14:hiddenEffects xmlns:a14="http://schemas.microsoft.com/office/drawing/2010/main">
-                <a:effectLst>
-                  <a:outerShdw dist="35921" dir="2700000" algn="ctr" rotWithShape="0">
-                    <a:schemeClr val="bg2"/>
-                  </a:outerShdw>
-                </a:effectLst>
-              </a14:hiddenEffects>
-            </a:ext>
-          </a:extLst>
-        </p:spPr>
-        <p:txBody>
-          <a:bodyPr wrap="square" lIns="43688" tIns="21843" rIns="43688" bIns="21843">
-            <a:spAutoFit/>
-          </a:bodyPr>
-          <a:lstStyle>
-            <a:lvl1pPr algn="l" defTabSz="438150">
-              <a:defRPr>
-                <a:solidFill>
-                  <a:schemeClr val="tx1"/>
-                </a:solidFill>
-                <a:latin typeface="Arial" charset="0"/>
-              </a:defRPr>
-            </a:lvl1pPr>
-            <a:lvl2pPr marL="219075" algn="l" defTabSz="438150">
-              <a:defRPr>
-                <a:solidFill>
-                  <a:schemeClr val="tx1"/>
-                </a:solidFill>
-                <a:latin typeface="Arial" charset="0"/>
-              </a:defRPr>
-            </a:lvl2pPr>
-            <a:lvl3pPr marL="438150" algn="l" defTabSz="438150">
-              <a:defRPr>
-                <a:solidFill>
-                  <a:schemeClr val="tx1"/>
-                </a:solidFill>
-                <a:latin typeface="Arial" charset="0"/>
-              </a:defRPr>
-            </a:lvl3pPr>
-            <a:lvl4pPr marL="654050" algn="l" defTabSz="438150">
-              <a:defRPr>
-                <a:solidFill>
-                  <a:schemeClr val="tx1"/>
-                </a:solidFill>
-                <a:latin typeface="Arial" charset="0"/>
-              </a:defRPr>
-            </a:lvl4pPr>
-            <a:lvl5pPr marL="873125" algn="l" defTabSz="438150">
-              <a:defRPr>
-                <a:solidFill>
-                  <a:schemeClr val="tx1"/>
-                </a:solidFill>
-                <a:latin typeface="Arial" charset="0"/>
-              </a:defRPr>
-            </a:lvl5pPr>
-            <a:lvl6pPr marL="1330325" defTabSz="438150" fontAlgn="base">
-              <a:spcBef>
-                <a:spcPct val="0"/>
-              </a:spcBef>
-              <a:spcAft>
-                <a:spcPct val="0"/>
-              </a:spcAft>
-              <a:defRPr>
-                <a:solidFill>
-                  <a:schemeClr val="tx1"/>
-                </a:solidFill>
-                <a:latin typeface="Arial" charset="0"/>
-              </a:defRPr>
-            </a:lvl6pPr>
-            <a:lvl7pPr marL="1787525" defTabSz="438150" fontAlgn="base">
-              <a:spcBef>
-                <a:spcPct val="0"/>
-              </a:spcBef>
-              <a:spcAft>
-                <a:spcPct val="0"/>
-              </a:spcAft>
-              <a:defRPr>
-                <a:solidFill>
-                  <a:schemeClr val="tx1"/>
-                </a:solidFill>
-                <a:latin typeface="Arial" charset="0"/>
-              </a:defRPr>
-            </a:lvl7pPr>
-            <a:lvl8pPr marL="2244725" defTabSz="438150" fontAlgn="base">
-              <a:spcBef>
-                <a:spcPct val="0"/>
-              </a:spcBef>
-              <a:spcAft>
-                <a:spcPct val="0"/>
-              </a:spcAft>
-              <a:defRPr>
-                <a:solidFill>
-                  <a:schemeClr val="tx1"/>
-                </a:solidFill>
-                <a:latin typeface="Arial" charset="0"/>
-              </a:defRPr>
-            </a:lvl8pPr>
-            <a:lvl9pPr marL="2701925" defTabSz="438150" fontAlgn="base">
-              <a:spcBef>
-                <a:spcPct val="0"/>
-              </a:spcBef>
-              <a:spcAft>
-                <a:spcPct val="0"/>
-              </a:spcAft>
-              <a:defRPr>
-                <a:solidFill>
-                  <a:schemeClr val="tx1"/>
-                </a:solidFill>
-                <a:latin typeface="Arial" charset="0"/>
-              </a:defRPr>
-            </a:lvl9pPr>
-          </a:lstStyle>
-          <a:p>
-            <a:pPr algn="ctr" eaLnBrk="0" hangingPunct="0">
-              <a:lnSpc>
-                <a:spcPct val="120000"/>
-              </a:lnSpc>
-            </a:pPr>
-            <a:r>
-              <a:rPr lang="en-US" altLang="en-US" sz="2800" dirty="0" smtClean="0">
-                <a:latin typeface="Arial"/>
-                <a:cs typeface="Arial"/>
-              </a:rPr>
-              <a:t>Theo Landsman </a:t>
-            </a:r>
-            <a:r>
-              <a:rPr lang="mr-IN" altLang="en-US" sz="2800" dirty="0" smtClean="0">
-                <a:latin typeface="Arial"/>
-                <a:cs typeface="Arial"/>
-              </a:rPr>
-              <a:t>’</a:t>
-            </a:r>
-            <a:r>
-              <a:rPr lang="en-US" altLang="en-US" sz="2800" dirty="0" smtClean="0">
-                <a:latin typeface="Arial"/>
-                <a:cs typeface="Arial"/>
-              </a:rPr>
-              <a:t>16, Alameda County Registrar of Voters, San Francisco County Department of Elections, Prof. Andrew Bray, Prof. Paul </a:t>
-            </a:r>
-            <a:r>
-              <a:rPr lang="en-US" altLang="en-US" sz="2800" dirty="0" err="1" smtClean="0">
-                <a:latin typeface="Arial"/>
-                <a:cs typeface="Arial"/>
-              </a:rPr>
-              <a:t>Gronke</a:t>
-            </a:r>
-            <a:r>
-              <a:rPr lang="en-US" altLang="en-US" sz="2800" dirty="0" smtClean="0">
-                <a:latin typeface="Arial"/>
-                <a:cs typeface="Arial"/>
-              </a:rPr>
-              <a:t>, and Chester </a:t>
-            </a:r>
-            <a:r>
-              <a:rPr lang="en-US" altLang="en-US" sz="2800" dirty="0" err="1" smtClean="0">
-                <a:latin typeface="Arial"/>
-                <a:cs typeface="Arial"/>
-              </a:rPr>
-              <a:t>Ismay</a:t>
-            </a:r>
-            <a:r>
-              <a:rPr lang="en-US" altLang="en-US" sz="2800" dirty="0" smtClean="0">
-                <a:latin typeface="Arial"/>
-                <a:cs typeface="Arial"/>
-              </a:rPr>
-              <a:t> </a:t>
-            </a:r>
-          </a:p>
-        </p:txBody>
-      </p:sp>
-      <p:pic>
-        <p:nvPicPr>
-          <p:cNvPr id="21" name="Picture 20" descr="rcv_process.jpg"/>
-          <p:cNvPicPr>
-            <a:picLocks noChangeAspect="1"/>
-          </p:cNvPicPr>
-          <p:nvPr/>
-        </p:nvPicPr>
-        <p:blipFill>
-          <a:blip r:embed="rId9">
-            <a:extLst>
-              <a:ext uri="{28A0092B-C50C-407E-A947-70E740481C1C}">
-                <a14:useLocalDpi xmlns:a14="http://schemas.microsoft.com/office/drawing/2010/main" val="0"/>
-              </a:ext>
-            </a:extLst>
-          </a:blip>
-          <a:stretch>
-            <a:fillRect/>
-          </a:stretch>
-        </p:blipFill>
-        <p:spPr>
-          <a:xfrm>
-            <a:off x="25159589" y="577153"/>
-            <a:ext cx="6686757" cy="10534543"/>
-          </a:xfrm>
-          <a:prstGeom prst="rect">
-            <a:avLst/>
-          </a:prstGeom>
-        </p:spPr>
-      </p:pic>
-      <p:cxnSp>
-        <p:nvCxnSpPr>
-          <p:cNvPr id="36" name="Straight Connector 35"/>
-          <p:cNvCxnSpPr/>
-          <p:nvPr/>
-        </p:nvCxnSpPr>
-        <p:spPr bwMode="auto">
-          <a:xfrm flipV="1">
-            <a:off x="24748855" y="11313286"/>
-            <a:ext cx="7503198" cy="16710"/>
-          </a:xfrm>
-          <a:prstGeom prst="line">
-            <a:avLst/>
-          </a:prstGeom>
-          <a:solidFill>
-            <a:schemeClr val="bg1"/>
-          </a:solidFill>
-          <a:ln w="9525" cap="flat" cmpd="sng" algn="ctr">
-            <a:solidFill>
-              <a:schemeClr val="tx1"/>
-            </a:solidFill>
-            <a:prstDash val="solid"/>
-            <a:round/>
-            <a:headEnd type="none" w="med" len="med"/>
-            <a:tailEnd type="none" w="med" len="med"/>
-          </a:ln>
-          <a:effectLst/>
-          <a:extLst>
-            <a:ext uri="{AF507438-7753-43e0-B8FC-AC1667EBCBE1}">
-              <a14:hiddenEffects xmlns:a14="http://schemas.microsoft.com/office/drawing/2010/main">
-                <a:effectLst>
-                  <a:outerShdw dist="35921" dir="2700000" algn="ctr" rotWithShape="0">
-                    <a:schemeClr val="bg2"/>
-                  </a:outerShdw>
-                </a:effectLst>
-              </a14:hiddenEffects>
-            </a:ext>
-          </a:extLst>
-        </p:spPr>
-      </p:cxnSp>
     </p:spTree>
     <p:extLst>
       <p:ext uri="{BB962C8B-B14F-4D97-AF65-F5344CB8AC3E}">
@@ -4918,7 +5082,7 @@
   <p:timing>
     <p:tnLst>
       <p:par>
-        <p:cTn xmlns:p14="http://schemas.microsoft.com/office/powerpoint/2010/main" id="1" dur="indefinite" restart="never" nodeType="tmRoot"/>
+        <p:cTn id="1" dur="indefinite" restart="never" nodeType="tmRoot"/>
       </p:par>
     </p:tnLst>
   </p:timing>
@@ -5175,7 +5339,7 @@
         <a:effectLst/>
         <a:extLst>
           <a:ext uri="{AF507438-7753-43e0-B8FC-AC1667EBCBE1}">
-            <a14:hiddenEffects xmlns:a14="http://schemas.microsoft.com/office/drawing/2010/main">
+            <a14:hiddenEffects xmlns:a14="http://schemas.microsoft.com/office/drawing/2010/main" xmlns="">
               <a:effectLst>
                 <a:outerShdw dist="35921" dir="2700000" algn="ctr" rotWithShape="0">
                   <a:schemeClr val="bg2"/>
@@ -5248,7 +5412,7 @@
         <a:effectLst/>
         <a:extLst>
           <a:ext uri="{AF507438-7753-43e0-B8FC-AC1667EBCBE1}">
-            <a14:hiddenEffects xmlns:a14="http://schemas.microsoft.com/office/drawing/2010/main">
+            <a14:hiddenEffects xmlns:a14="http://schemas.microsoft.com/office/drawing/2010/main" xmlns="">
               <a:effectLst>
                 <a:outerShdw dist="35921" dir="2700000" algn="ctr" rotWithShape="0">
                   <a:schemeClr val="bg2"/>

</xml_diff>